<commit_message>
typos on final version
</commit_message>
<xml_diff>
--- a/03-hardin/skillsForResearch_JSM17_JoHardin.pptx
+++ b/03-hardin/skillsForResearch_JSM17_JoHardin.pptx
@@ -205,7 +205,7 @@
           <a:p>
             <a:fld id="{51F23AE1-7BC9-1746-961C-E0E2DE455D32}" type="datetimeFigureOut">
               <a:rPr lang="en-US" smtClean="0"/>
-              <a:t>7/26/17</a:t>
+              <a:t>8/2/17</a:t>
             </a:fld>
             <a:endParaRPr lang="en-US"/>
           </a:p>
@@ -1393,7 +1393,7 @@
           <a:p>
             <a:fld id="{A2F0292D-1797-49A5-8D2D-8D50C72EF3CC}" type="datetimeFigureOut">
               <a:rPr lang="en-US" smtClean="0"/>
-              <a:t>7/26/17</a:t>
+              <a:t>8/2/17</a:t>
             </a:fld>
             <a:endParaRPr lang="en-US"/>
           </a:p>
@@ -1872,7 +1872,7 @@
           <a:p>
             <a:fld id="{A2F0292D-1797-49A5-8D2D-8D50C72EF3CC}" type="datetimeFigureOut">
               <a:rPr lang="en-US" smtClean="0"/>
-              <a:t>7/26/17</a:t>
+              <a:t>8/2/17</a:t>
             </a:fld>
             <a:endParaRPr lang="en-US"/>
           </a:p>
@@ -2101,7 +2101,7 @@
           <a:p>
             <a:fld id="{A2F0292D-1797-49A5-8D2D-8D50C72EF3CC}" type="datetimeFigureOut">
               <a:rPr lang="en-US" smtClean="0"/>
-              <a:t>7/26/17</a:t>
+              <a:t>8/2/17</a:t>
             </a:fld>
             <a:endParaRPr lang="en-US"/>
           </a:p>
@@ -2331,7 +2331,7 @@
           <a:p>
             <a:fld id="{A2F0292D-1797-49A5-8D2D-8D50C72EF3CC}" type="datetimeFigureOut">
               <a:rPr lang="en-US" smtClean="0"/>
-              <a:t>7/26/17</a:t>
+              <a:t>8/2/17</a:t>
             </a:fld>
             <a:endParaRPr lang="en-US"/>
           </a:p>
@@ -2663,7 +2663,7 @@
           <a:p>
             <a:fld id="{A2F0292D-1797-49A5-8D2D-8D50C72EF3CC}" type="datetimeFigureOut">
               <a:rPr lang="en-US" smtClean="0"/>
-              <a:t>7/26/17</a:t>
+              <a:t>8/2/17</a:t>
             </a:fld>
             <a:endParaRPr lang="en-US"/>
           </a:p>
@@ -3021,7 +3021,7 @@
           <a:p>
             <a:fld id="{A2F0292D-1797-49A5-8D2D-8D50C72EF3CC}" type="datetimeFigureOut">
               <a:rPr lang="en-US" smtClean="0"/>
-              <a:t>7/26/17</a:t>
+              <a:t>8/2/17</a:t>
             </a:fld>
             <a:endParaRPr lang="en-US"/>
           </a:p>
@@ -3497,7 +3497,7 @@
           <a:p>
             <a:fld id="{A2F0292D-1797-49A5-8D2D-8D50C72EF3CC}" type="datetimeFigureOut">
               <a:rPr lang="en-US" smtClean="0"/>
-              <a:t>7/26/17</a:t>
+              <a:t>8/2/17</a:t>
             </a:fld>
             <a:endParaRPr lang="en-US"/>
           </a:p>
@@ -4178,7 +4178,7 @@
           <a:p>
             <a:fld id="{A2F0292D-1797-49A5-8D2D-8D50C72EF3CC}" type="datetimeFigureOut">
               <a:rPr lang="en-US" smtClean="0"/>
-              <a:t>7/26/17</a:t>
+              <a:t>8/2/17</a:t>
             </a:fld>
             <a:endParaRPr lang="en-US"/>
           </a:p>
@@ -4357,7 +4357,7 @@
           <a:p>
             <a:fld id="{A2F0292D-1797-49A5-8D2D-8D50C72EF3CC}" type="datetimeFigureOut">
               <a:rPr lang="en-US" smtClean="0"/>
-              <a:t>7/26/17</a:t>
+              <a:t>8/2/17</a:t>
             </a:fld>
             <a:endParaRPr lang="en-US"/>
           </a:p>
@@ -4528,7 +4528,7 @@
           <a:p>
             <a:fld id="{A2F0292D-1797-49A5-8D2D-8D50C72EF3CC}" type="datetimeFigureOut">
               <a:rPr lang="en-US" smtClean="0"/>
-              <a:t>7/26/17</a:t>
+              <a:t>8/2/17</a:t>
             </a:fld>
             <a:endParaRPr lang="en-US"/>
           </a:p>
@@ -4618,7 +4618,7 @@
           <a:p>
             <a:fld id="{A2F0292D-1797-49A5-8D2D-8D50C72EF3CC}" type="datetimeFigureOut">
               <a:rPr lang="en-US" smtClean="0"/>
-              <a:t>7/26/17</a:t>
+              <a:t>8/2/17</a:t>
             </a:fld>
             <a:endParaRPr lang="en-US"/>
           </a:p>
@@ -5640,7 +5640,7 @@
           <a:p>
             <a:fld id="{A2F0292D-1797-49A5-8D2D-8D50C72EF3CC}" type="datetimeFigureOut">
               <a:rPr lang="en-US" smtClean="0"/>
-              <a:t>7/26/17</a:t>
+              <a:t>8/2/17</a:t>
             </a:fld>
             <a:endParaRPr lang="en-US"/>
           </a:p>
@@ -6215,7 +6215,7 @@
           <a:p>
             <a:fld id="{A2F0292D-1797-49A5-8D2D-8D50C72EF3CC}" type="datetimeFigureOut">
               <a:rPr lang="en-US" smtClean="0"/>
-              <a:t>7/26/17</a:t>
+              <a:t>8/2/17</a:t>
             </a:fld>
             <a:endParaRPr lang="en-US"/>
           </a:p>
@@ -6723,7 +6723,7 @@
           <a:p>
             <a:fld id="{A2F0292D-1797-49A5-8D2D-8D50C72EF3CC}" type="datetimeFigureOut">
               <a:rPr lang="en-US" smtClean="0"/>
-              <a:t>7/26/17</a:t>
+              <a:t>8/2/17</a:t>
             </a:fld>
             <a:endParaRPr lang="en-US"/>
           </a:p>
@@ -7143,7 +7143,7 @@
           <a:p>
             <a:fld id="{A2F0292D-1797-49A5-8D2D-8D50C72EF3CC}" type="datetimeFigureOut">
               <a:rPr lang="en-US" smtClean="0"/>
-              <a:t>7/26/17</a:t>
+              <a:t>8/2/17</a:t>
             </a:fld>
             <a:endParaRPr lang="en-US"/>
           </a:p>
@@ -7507,7 +7507,7 @@
           <a:p>
             <a:fld id="{A2F0292D-1797-49A5-8D2D-8D50C72EF3CC}" type="datetimeFigureOut">
               <a:rPr lang="en-US" smtClean="0"/>
-              <a:t>7/26/17</a:t>
+              <a:t>8/2/17</a:t>
             </a:fld>
             <a:endParaRPr lang="en-US"/>
           </a:p>
@@ -8053,7 +8053,7 @@
           <a:p>
             <a:fld id="{A2F0292D-1797-49A5-8D2D-8D50C72EF3CC}" type="datetimeFigureOut">
               <a:rPr lang="en-US" smtClean="0"/>
-              <a:t>7/26/17</a:t>
+              <a:t>8/2/17</a:t>
             </a:fld>
             <a:endParaRPr lang="en-US"/>
           </a:p>
@@ -8166,7 +8166,7 @@
           <a:p>
             <a:fld id="{A2F0292D-1797-49A5-8D2D-8D50C72EF3CC}" type="datetimeFigureOut">
               <a:rPr lang="en-US" smtClean="0"/>
-              <a:t>7/26/17</a:t>
+              <a:t>8/2/17</a:t>
             </a:fld>
             <a:endParaRPr lang="en-US"/>
           </a:p>
@@ -9465,13 +9465,22 @@
           <a:p>
             <a:r>
               <a:rPr lang="en-US" dirty="0" smtClean="0"/>
-              <a:t>Learn how to problem solve independently.</a:t>
-            </a:r>
-          </a:p>
-          <a:p>
+              <a:t>Learn how to problem solve </a:t>
+            </a:r>
             <a:r>
               <a:rPr lang="en-US" dirty="0" smtClean="0"/>
-              <a:t>Data wrangling should happen in every class at every level.</a:t>
+              <a:t>independently</a:t>
+            </a:r>
+            <a:endParaRPr lang="en-US" dirty="0" smtClean="0"/>
+          </a:p>
+          <a:p>
+            <a:r>
+              <a:rPr lang="en-US" dirty="0" smtClean="0"/>
+              <a:t>Data wrangling should happen in every class at every </a:t>
+            </a:r>
+            <a:r>
+              <a:rPr lang="en-US" dirty="0" smtClean="0"/>
+              <a:t>level</a:t>
             </a:r>
             <a:endParaRPr lang="en-US" dirty="0"/>
           </a:p>
@@ -9903,19 +9912,7 @@
           <a:p>
             <a:r>
               <a:rPr lang="en-US" sz="2000" dirty="0" smtClean="0"/>
-              <a:t>Become </a:t>
-            </a:r>
-            <a:r>
-              <a:rPr lang="en-US" sz="2000" dirty="0" smtClean="0"/>
-              <a:t>a part of the larger community (e.g., </a:t>
-            </a:r>
-            <a:r>
-              <a:rPr lang="en-US" sz="2000" dirty="0" smtClean="0"/>
-              <a:t>quo() </a:t>
-            </a:r>
-            <a:r>
-              <a:rPr lang="en-US" sz="2000" dirty="0" smtClean="0"/>
-              <a:t>function in </a:t>
+              <a:t>Become a part of the larger community (e.g., quo() function in </a:t>
             </a:r>
             <a:r>
               <a:rPr lang="en-US" sz="2000" dirty="0" err="1" smtClean="0"/>
@@ -10323,18 +10320,12 @@
               <a:rPr lang="en-US" dirty="0" smtClean="0"/>
               <a:t>Statistics curriculum guidelines</a:t>
             </a:r>
-            <a:endParaRPr lang="en-US" dirty="0" smtClean="0"/>
           </a:p>
           <a:p>
             <a:r>
               <a:rPr lang="en-US" dirty="0" smtClean="0"/>
-              <a:t>Data </a:t>
-            </a:r>
-            <a:r>
-              <a:rPr lang="en-US" dirty="0" smtClean="0"/>
-              <a:t>science curriculum guidelines</a:t>
-            </a:r>
-            <a:endParaRPr lang="en-US" dirty="0" smtClean="0"/>
+              <a:t>Data science curriculum guidelines</a:t>
+            </a:r>
           </a:p>
           <a:p>
             <a:r>
@@ -10415,11 +10406,7 @@
           <a:p>
             <a:r>
               <a:rPr lang="en-US" dirty="0" smtClean="0"/>
-              <a:t>Needed s</a:t>
-            </a:r>
-            <a:r>
-              <a:rPr lang="en-US" dirty="0" smtClean="0"/>
-              <a:t>kills for successful undergrad research</a:t>
+              <a:t>Needed skills for successful undergrad research</a:t>
             </a:r>
             <a:endParaRPr lang="en-US" dirty="0"/>
           </a:p>
@@ -11523,8 +11510,8 @@
               <a:buChar char="•"/>
             </a:pPr>
             <a:r>
-              <a:rPr lang="en-US" sz="2000" dirty="0" smtClean="0"/>
-              <a:t>June 2016 – July 2017</a:t>
+              <a:rPr lang="en-US" sz="2000" dirty="0"/>
+              <a:t>Kept coming back to his knowledge of prediction intervals for SLR (MSE)</a:t>
             </a:r>
           </a:p>
           <a:p>
@@ -11534,7 +11521,11 @@
             </a:pPr>
             <a:r>
               <a:rPr lang="en-US" sz="2000" dirty="0" smtClean="0"/>
-              <a:t>Kept coming back to his knowledge of prediction intervals for SLR (MSE)</a:t>
+              <a:t>June </a:t>
+            </a:r>
+            <a:r>
+              <a:rPr lang="en-US" sz="2000" dirty="0" smtClean="0"/>
+              <a:t>2016 – July 2017</a:t>
             </a:r>
           </a:p>
           <a:p>
@@ -11544,7 +11535,11 @@
             </a:pPr>
             <a:r>
               <a:rPr lang="en-US" sz="2000" dirty="0" smtClean="0"/>
-              <a:t>Organization was impeccable</a:t>
+              <a:t>Organization </a:t>
+            </a:r>
+            <a:r>
+              <a:rPr lang="en-US" sz="2000" dirty="0" smtClean="0"/>
+              <a:t>was impeccable</a:t>
             </a:r>
           </a:p>
           <a:p>
@@ -11755,7 +11750,15 @@
           <a:p>
             <a:r>
               <a:rPr lang="en-US" dirty="0" smtClean="0"/>
-              <a:t>What do I still not understand?</a:t>
+              <a:t>What do </a:t>
+            </a:r>
+            <a:r>
+              <a:rPr lang="en-US" dirty="0" smtClean="0"/>
+              <a:t>you </a:t>
+            </a:r>
+            <a:r>
+              <a:rPr lang="en-US" dirty="0" smtClean="0"/>
+              <a:t>still not understand?</a:t>
             </a:r>
             <a:endParaRPr lang="en-US" dirty="0"/>
           </a:p>

</xml_diff>